<commit_message>
Update Customer Churn Prediction.pptx
</commit_message>
<xml_diff>
--- a/Customer Churn Prediction.pptx
+++ b/Customer Churn Prediction.pptx
@@ -9,8 +9,8 @@
     <p:sldId id="257" r:id="rId3"/>
     <p:sldId id="261" r:id="rId4"/>
     <p:sldId id="262" r:id="rId5"/>
-    <p:sldId id="265" r:id="rId6"/>
-    <p:sldId id="263" r:id="rId7"/>
+    <p:sldId id="263" r:id="rId6"/>
+    <p:sldId id="265" r:id="rId7"/>
     <p:sldId id="264" r:id="rId8"/>
     <p:sldId id="266" r:id="rId9"/>
     <p:sldId id="267" r:id="rId10"/>
@@ -10804,7 +10804,7 @@
         </p:nvSpPr>
         <p:spPr>
           <a:xfrm>
-            <a:off x="555503" y="411147"/>
+            <a:off x="422981" y="146104"/>
             <a:ext cx="5065106" cy="769441"/>
           </a:xfrm>
           <a:prstGeom prst="rect">
@@ -10848,8 +10848,8 @@
         </p:blipFill>
         <p:spPr>
           <a:xfrm>
-            <a:off x="555503" y="1507346"/>
-            <a:ext cx="6228474" cy="3843307"/>
+            <a:off x="490330" y="971157"/>
+            <a:ext cx="5406887" cy="3137017"/>
           </a:xfrm>
           <a:prstGeom prst="rect">
             <a:avLst/>
@@ -10878,8 +10878,8 @@
         </p:blipFill>
         <p:spPr>
           <a:xfrm>
-            <a:off x="7920867" y="1507346"/>
-            <a:ext cx="3600059" cy="3843307"/>
+            <a:off x="5897217" y="971157"/>
+            <a:ext cx="2689444" cy="3137017"/>
           </a:xfrm>
           <a:prstGeom prst="rect">
             <a:avLst/>
@@ -10908,8 +10908,8 @@
         </p:blipFill>
         <p:spPr>
           <a:xfrm>
-            <a:off x="564212" y="1516057"/>
-            <a:ext cx="2832131" cy="3838026"/>
+            <a:off x="8586661" y="971157"/>
+            <a:ext cx="2305345" cy="3137017"/>
           </a:xfrm>
           <a:prstGeom prst="rect">
             <a:avLst/>
@@ -10938,8 +10938,8 @@
         </p:blipFill>
         <p:spPr>
           <a:xfrm>
-            <a:off x="9631687" y="1516057"/>
-            <a:ext cx="1872342" cy="3811215"/>
+            <a:off x="7650490" y="4163787"/>
+            <a:ext cx="1872342" cy="2548109"/>
           </a:xfrm>
           <a:prstGeom prst="rect">
             <a:avLst/>
@@ -10968,8 +10968,8 @@
         </p:blipFill>
         <p:spPr>
           <a:xfrm>
-            <a:off x="6279634" y="1507349"/>
-            <a:ext cx="3325926" cy="3845909"/>
+            <a:off x="3825124" y="4153087"/>
+            <a:ext cx="3325926" cy="2558809"/>
           </a:xfrm>
           <a:prstGeom prst="rect">
             <a:avLst/>
@@ -10998,8 +10998,8 @@
         </p:blipFill>
         <p:spPr>
           <a:xfrm>
-            <a:off x="3439888" y="1498640"/>
-            <a:ext cx="2804910" cy="3856752"/>
+            <a:off x="490330" y="4163786"/>
+            <a:ext cx="2804910" cy="2548110"/>
           </a:xfrm>
           <a:prstGeom prst="rect">
             <a:avLst/>
@@ -11046,40 +11046,27 @@
       </p:grpSpPr>
       <p:pic>
         <p:nvPicPr>
-          <p:cNvPr id="8" name="Picture 7">
-            <a:extLst>
-              <a:ext uri="{FF2B5EF4-FFF2-40B4-BE49-F238E27FC236}">
-                <a16:creationId xmlns:a16="http://schemas.microsoft.com/office/drawing/2014/main" id="{E271BC1A-2495-4E1D-BD88-42E31BEB778E}"/>
-              </a:ext>
-            </a:extLst>
-          </p:cNvPr>
+          <p:cNvPr id="2" name="Picture 1"/>
           <p:cNvPicPr>
             <a:picLocks noChangeAspect="1"/>
           </p:cNvPicPr>
           <p:nvPr/>
         </p:nvPicPr>
-        <p:blipFill>
+        <p:blipFill rotWithShape="1">
           <a:blip r:embed="rId2">
             <a:extLst>
-              <a:ext uri="{BEBA8EAE-BF5A-486C-A8C5-ECC9F3942E4B}">
-                <a14:imgProps xmlns:a14="http://schemas.microsoft.com/office/drawing/2010/main">
-                  <a14:imgLayer r:embed="rId3">
-                    <a14:imgEffect>
-                      <a14:artisticCrisscrossEtching/>
-                    </a14:imgEffect>
-                  </a14:imgLayer>
-                </a14:imgProps>
+              <a:ext uri="{28A0092B-C50C-407E-A947-70E740481C1C}">
+                <a14:useLocalDpi xmlns:a14="http://schemas.microsoft.com/office/drawing/2010/main" val="0"/>
               </a:ext>
             </a:extLst>
           </a:blip>
-          <a:stretch>
-            <a:fillRect/>
-          </a:stretch>
+          <a:srcRect b="5143"/>
+          <a:stretch/>
         </p:blipFill>
         <p:spPr>
           <a:xfrm>
-            <a:off x="26503" y="67067"/>
-            <a:ext cx="12192000" cy="6857999"/>
+            <a:off x="0" y="0"/>
+            <a:ext cx="12192000" cy="6858000"/>
           </a:xfrm>
           <a:prstGeom prst="rect">
             <a:avLst/>
@@ -11116,335 +11103,10 @@
           </a:sp3d>
         </p:spPr>
       </p:pic>
-      <p:sp>
-        <p:nvSpPr>
-          <p:cNvPr id="6" name="Rectangle 5"/>
-          <p:cNvSpPr/>
-          <p:nvPr/>
-        </p:nvSpPr>
-        <p:spPr>
-          <a:xfrm>
-            <a:off x="445138" y="238102"/>
-            <a:ext cx="3646704" cy="707886"/>
-          </a:xfrm>
-          <a:prstGeom prst="rect">
-            <a:avLst/>
-          </a:prstGeom>
-          <a:noFill/>
-        </p:spPr>
-        <p:txBody>
-          <a:bodyPr wrap="none" lIns="91440" tIns="45720" rIns="91440" bIns="45720">
-            <a:spAutoFit/>
-          </a:bodyPr>
-          <a:lstStyle/>
-          <a:p>
-            <a:pPr algn="ctr"/>
-            <a:r>
-              <a:rPr lang="en-US" sz="4000" dirty="0"/>
-              <a:t>Data Description</a:t>
-            </a:r>
-          </a:p>
-        </p:txBody>
-      </p:sp>
-      <p:sp>
-        <p:nvSpPr>
-          <p:cNvPr id="7" name="Rectangle 6"/>
-          <p:cNvSpPr/>
-          <p:nvPr/>
-        </p:nvSpPr>
-        <p:spPr>
-          <a:xfrm>
-            <a:off x="1496112" y="1042808"/>
-            <a:ext cx="10053213" cy="5632311"/>
-          </a:xfrm>
-          <a:prstGeom prst="rect">
-            <a:avLst/>
-          </a:prstGeom>
-          <a:noFill/>
-        </p:spPr>
-        <p:txBody>
-          <a:bodyPr wrap="square" lIns="91440" tIns="45720" rIns="91440" bIns="45720">
-            <a:prstTxWarp prst="textPlain">
-              <a:avLst/>
-            </a:prstTxWarp>
-            <a:spAutoFit/>
-          </a:bodyPr>
-          <a:lstStyle/>
-          <a:p>
-            <a:pPr marL="285750" indent="-285750" fontAlgn="base">
-              <a:buFont typeface="Wingdings" panose="05000000000000000000" pitchFamily="2" charset="2"/>
-              <a:buChar char="v"/>
-            </a:pPr>
-            <a:r>
-              <a:rPr lang="en-US" dirty="0"/>
-              <a:t>state: Categorical, for the 51 states and the District of Columbia.</a:t>
-            </a:r>
-          </a:p>
-          <a:p>
-            <a:pPr marL="285750" indent="-285750" fontAlgn="base">
-              <a:buFont typeface="Wingdings" panose="05000000000000000000" pitchFamily="2" charset="2"/>
-              <a:buChar char="v"/>
-            </a:pPr>
-            <a:r>
-              <a:rPr lang="en-US" dirty="0" err="1"/>
-              <a:t>Area.code</a:t>
-            </a:r>
-            <a:endParaRPr lang="en-US" dirty="0"/>
-          </a:p>
-          <a:p>
-            <a:pPr marL="285750" indent="-285750" fontAlgn="base">
-              <a:buFont typeface="Wingdings" panose="05000000000000000000" pitchFamily="2" charset="2"/>
-              <a:buChar char="v"/>
-            </a:pPr>
-            <a:r>
-              <a:rPr lang="en-US" dirty="0" err="1"/>
-              <a:t>account.length</a:t>
-            </a:r>
-            <a:r>
-              <a:rPr lang="en-US" dirty="0"/>
-              <a:t>: how long the account has been active.</a:t>
-            </a:r>
-          </a:p>
-          <a:p>
-            <a:pPr marL="285750" indent="-285750" fontAlgn="base">
-              <a:buFont typeface="Wingdings" panose="05000000000000000000" pitchFamily="2" charset="2"/>
-              <a:buChar char="v"/>
-            </a:pPr>
-            <a:r>
-              <a:rPr lang="en-US" dirty="0" err="1"/>
-              <a:t>voice.plan</a:t>
-            </a:r>
-            <a:r>
-              <a:rPr lang="en-US" dirty="0"/>
-              <a:t>: yes or no, voicemail plan.</a:t>
-            </a:r>
-          </a:p>
-          <a:p>
-            <a:pPr marL="285750" indent="-285750" fontAlgn="base">
-              <a:buFont typeface="Wingdings" panose="05000000000000000000" pitchFamily="2" charset="2"/>
-              <a:buChar char="v"/>
-            </a:pPr>
-            <a:r>
-              <a:rPr lang="en-US" dirty="0" err="1"/>
-              <a:t>voice.messages</a:t>
-            </a:r>
-            <a:r>
-              <a:rPr lang="en-US" dirty="0"/>
-              <a:t>: number of voicemail messages.</a:t>
-            </a:r>
-          </a:p>
-          <a:p>
-            <a:pPr marL="285750" indent="-285750" fontAlgn="base">
-              <a:buFont typeface="Wingdings" panose="05000000000000000000" pitchFamily="2" charset="2"/>
-              <a:buChar char="v"/>
-            </a:pPr>
-            <a:r>
-              <a:rPr lang="en-US" dirty="0" err="1"/>
-              <a:t>intl.plan</a:t>
-            </a:r>
-            <a:r>
-              <a:rPr lang="en-US" dirty="0"/>
-              <a:t>: yes or no, international plan.</a:t>
-            </a:r>
-          </a:p>
-          <a:p>
-            <a:pPr marL="285750" indent="-285750" fontAlgn="base">
-              <a:buFont typeface="Wingdings" panose="05000000000000000000" pitchFamily="2" charset="2"/>
-              <a:buChar char="v"/>
-            </a:pPr>
-            <a:r>
-              <a:rPr lang="en-US" dirty="0" err="1"/>
-              <a:t>intl.mins</a:t>
-            </a:r>
-            <a:r>
-              <a:rPr lang="en-US" dirty="0"/>
-              <a:t>: minutes customer used service to make international calls.</a:t>
-            </a:r>
-          </a:p>
-          <a:p>
-            <a:pPr marL="285750" indent="-285750" fontAlgn="base">
-              <a:buFont typeface="Wingdings" panose="05000000000000000000" pitchFamily="2" charset="2"/>
-              <a:buChar char="v"/>
-            </a:pPr>
-            <a:r>
-              <a:rPr lang="en-US" dirty="0" err="1"/>
-              <a:t>intl.calls</a:t>
-            </a:r>
-            <a:r>
-              <a:rPr lang="en-US" dirty="0"/>
-              <a:t>: total number of international calls.</a:t>
-            </a:r>
-          </a:p>
-          <a:p>
-            <a:pPr marL="285750" indent="-285750" fontAlgn="base">
-              <a:buFont typeface="Wingdings" panose="05000000000000000000" pitchFamily="2" charset="2"/>
-              <a:buChar char="v"/>
-            </a:pPr>
-            <a:r>
-              <a:rPr lang="en-US" dirty="0" err="1"/>
-              <a:t>intl.charge</a:t>
-            </a:r>
-            <a:r>
-              <a:rPr lang="en-US" dirty="0"/>
-              <a:t>: total international charge.</a:t>
-            </a:r>
-          </a:p>
-          <a:p>
-            <a:pPr marL="285750" indent="-285750" fontAlgn="base">
-              <a:buFont typeface="Wingdings" panose="05000000000000000000" pitchFamily="2" charset="2"/>
-              <a:buChar char="v"/>
-            </a:pPr>
-            <a:r>
-              <a:rPr lang="en-US" dirty="0" err="1"/>
-              <a:t>day.mins</a:t>
-            </a:r>
-            <a:r>
-              <a:rPr lang="en-US" dirty="0"/>
-              <a:t>: minutes customer used service during the day.</a:t>
-            </a:r>
-          </a:p>
-          <a:p>
-            <a:pPr marL="285750" indent="-285750" fontAlgn="base">
-              <a:buFont typeface="Wingdings" panose="05000000000000000000" pitchFamily="2" charset="2"/>
-              <a:buChar char="v"/>
-            </a:pPr>
-            <a:r>
-              <a:rPr lang="en-US" dirty="0" err="1"/>
-              <a:t>day.calls</a:t>
-            </a:r>
-            <a:r>
-              <a:rPr lang="en-US" dirty="0"/>
-              <a:t>: total number of calls during the day.</a:t>
-            </a:r>
-          </a:p>
-          <a:p>
-            <a:pPr marL="285750" indent="-285750" fontAlgn="base">
-              <a:buFont typeface="Wingdings" panose="05000000000000000000" pitchFamily="2" charset="2"/>
-              <a:buChar char="v"/>
-            </a:pPr>
-            <a:r>
-              <a:rPr lang="en-US" dirty="0" err="1"/>
-              <a:t>day.charge</a:t>
-            </a:r>
-            <a:r>
-              <a:rPr lang="en-US" dirty="0"/>
-              <a:t>: total charge during the day.</a:t>
-            </a:r>
-          </a:p>
-          <a:p>
-            <a:pPr marL="285750" indent="-285750" fontAlgn="base">
-              <a:buFont typeface="Wingdings" panose="05000000000000000000" pitchFamily="2" charset="2"/>
-              <a:buChar char="v"/>
-            </a:pPr>
-            <a:r>
-              <a:rPr lang="en-US" dirty="0" err="1"/>
-              <a:t>eve.mins</a:t>
-            </a:r>
-            <a:r>
-              <a:rPr lang="en-US" dirty="0"/>
-              <a:t>: minutes customer used service during the evening.</a:t>
-            </a:r>
-          </a:p>
-          <a:p>
-            <a:pPr marL="285750" indent="-285750" fontAlgn="base">
-              <a:buFont typeface="Wingdings" panose="05000000000000000000" pitchFamily="2" charset="2"/>
-              <a:buChar char="v"/>
-            </a:pPr>
-            <a:r>
-              <a:rPr lang="en-US" dirty="0" err="1"/>
-              <a:t>eve.calls</a:t>
-            </a:r>
-            <a:r>
-              <a:rPr lang="en-US" dirty="0"/>
-              <a:t>: total number of calls during the evening.</a:t>
-            </a:r>
-          </a:p>
-          <a:p>
-            <a:pPr marL="285750" indent="-285750" fontAlgn="base">
-              <a:buFont typeface="Wingdings" panose="05000000000000000000" pitchFamily="2" charset="2"/>
-              <a:buChar char="v"/>
-            </a:pPr>
-            <a:r>
-              <a:rPr lang="en-US" dirty="0" err="1"/>
-              <a:t>eve.charge</a:t>
-            </a:r>
-            <a:r>
-              <a:rPr lang="en-US" dirty="0"/>
-              <a:t>: total charge during the evening.</a:t>
-            </a:r>
-          </a:p>
-          <a:p>
-            <a:pPr marL="285750" indent="-285750" fontAlgn="base">
-              <a:buFont typeface="Wingdings" panose="05000000000000000000" pitchFamily="2" charset="2"/>
-              <a:buChar char="v"/>
-            </a:pPr>
-            <a:r>
-              <a:rPr lang="en-US" dirty="0" err="1"/>
-              <a:t>night.mins</a:t>
-            </a:r>
-            <a:r>
-              <a:rPr lang="en-US" dirty="0"/>
-              <a:t>: minutes customer used service during the night.</a:t>
-            </a:r>
-          </a:p>
-          <a:p>
-            <a:pPr marL="285750" indent="-285750" fontAlgn="base">
-              <a:buFont typeface="Wingdings" panose="05000000000000000000" pitchFamily="2" charset="2"/>
-              <a:buChar char="v"/>
-            </a:pPr>
-            <a:r>
-              <a:rPr lang="en-US" dirty="0" err="1"/>
-              <a:t>night.calls</a:t>
-            </a:r>
-            <a:r>
-              <a:rPr lang="en-US" dirty="0"/>
-              <a:t>: total number of calls during the night.</a:t>
-            </a:r>
-          </a:p>
-          <a:p>
-            <a:pPr marL="285750" indent="-285750" fontAlgn="base">
-              <a:buFont typeface="Wingdings" panose="05000000000000000000" pitchFamily="2" charset="2"/>
-              <a:buChar char="v"/>
-            </a:pPr>
-            <a:r>
-              <a:rPr lang="en-US" dirty="0" err="1"/>
-              <a:t>night.charge</a:t>
-            </a:r>
-            <a:r>
-              <a:rPr lang="en-US" dirty="0"/>
-              <a:t>: total charge during the night.</a:t>
-            </a:r>
-          </a:p>
-          <a:p>
-            <a:pPr marL="285750" indent="-285750" fontAlgn="base">
-              <a:buFont typeface="Wingdings" panose="05000000000000000000" pitchFamily="2" charset="2"/>
-              <a:buChar char="v"/>
-            </a:pPr>
-            <a:r>
-              <a:rPr lang="en-US" dirty="0" err="1"/>
-              <a:t>customer.calls</a:t>
-            </a:r>
-            <a:r>
-              <a:rPr lang="en-US" dirty="0"/>
-              <a:t>: number of calls to customer service.</a:t>
-            </a:r>
-          </a:p>
-          <a:p>
-            <a:pPr marL="285750" indent="-285750" fontAlgn="base">
-              <a:buFont typeface="Wingdings" panose="05000000000000000000" pitchFamily="2" charset="2"/>
-              <a:buChar char="v"/>
-            </a:pPr>
-            <a:r>
-              <a:rPr lang="en-US" dirty="0"/>
-              <a:t>churn: Categorical, yes or no. Indicator of whether the customer has left the company (yes or no).</a:t>
-            </a:r>
-          </a:p>
-        </p:txBody>
-      </p:sp>
     </p:spTree>
     <p:extLst>
       <p:ext uri="{BB962C8B-B14F-4D97-AF65-F5344CB8AC3E}">
-        <p14:creationId xmlns:p14="http://schemas.microsoft.com/office/powerpoint/2010/main" val="2028034087"/>
+        <p14:creationId xmlns:p14="http://schemas.microsoft.com/office/powerpoint/2010/main" val="3652519210"/>
       </p:ext>
     </p:extLst>
   </p:cSld>
@@ -11473,27 +11135,40 @@
       </p:grpSpPr>
       <p:pic>
         <p:nvPicPr>
-          <p:cNvPr id="2" name="Picture 1"/>
+          <p:cNvPr id="8" name="Picture 7">
+            <a:extLst>
+              <a:ext uri="{FF2B5EF4-FFF2-40B4-BE49-F238E27FC236}">
+                <a16:creationId xmlns:a16="http://schemas.microsoft.com/office/drawing/2014/main" id="{E271BC1A-2495-4E1D-BD88-42E31BEB778E}"/>
+              </a:ext>
+            </a:extLst>
+          </p:cNvPr>
           <p:cNvPicPr>
             <a:picLocks noChangeAspect="1"/>
           </p:cNvPicPr>
           <p:nvPr/>
         </p:nvPicPr>
-        <p:blipFill rotWithShape="1">
+        <p:blipFill>
           <a:blip r:embed="rId2">
             <a:extLst>
-              <a:ext uri="{28A0092B-C50C-407E-A947-70E740481C1C}">
-                <a14:useLocalDpi xmlns:a14="http://schemas.microsoft.com/office/drawing/2010/main" val="0"/>
+              <a:ext uri="{BEBA8EAE-BF5A-486C-A8C5-ECC9F3942E4B}">
+                <a14:imgProps xmlns:a14="http://schemas.microsoft.com/office/drawing/2010/main">
+                  <a14:imgLayer r:embed="rId3">
+                    <a14:imgEffect>
+                      <a14:artisticCrisscrossEtching/>
+                    </a14:imgEffect>
+                  </a14:imgLayer>
+                </a14:imgProps>
               </a:ext>
             </a:extLst>
           </a:blip>
-          <a:srcRect b="5143"/>
-          <a:stretch/>
+          <a:stretch>
+            <a:fillRect/>
+          </a:stretch>
         </p:blipFill>
         <p:spPr>
           <a:xfrm>
-            <a:off x="0" y="0"/>
-            <a:ext cx="12192000" cy="6858000"/>
+            <a:off x="26503" y="67067"/>
+            <a:ext cx="12192000" cy="6857999"/>
           </a:xfrm>
           <a:prstGeom prst="rect">
             <a:avLst/>
@@ -11530,10 +11205,335 @@
           </a:sp3d>
         </p:spPr>
       </p:pic>
+      <p:sp>
+        <p:nvSpPr>
+          <p:cNvPr id="6" name="Rectangle 5"/>
+          <p:cNvSpPr/>
+          <p:nvPr/>
+        </p:nvSpPr>
+        <p:spPr>
+          <a:xfrm>
+            <a:off x="445138" y="238102"/>
+            <a:ext cx="3646704" cy="707886"/>
+          </a:xfrm>
+          <a:prstGeom prst="rect">
+            <a:avLst/>
+          </a:prstGeom>
+          <a:noFill/>
+        </p:spPr>
+        <p:txBody>
+          <a:bodyPr wrap="none" lIns="91440" tIns="45720" rIns="91440" bIns="45720">
+            <a:spAutoFit/>
+          </a:bodyPr>
+          <a:lstStyle/>
+          <a:p>
+            <a:pPr algn="ctr"/>
+            <a:r>
+              <a:rPr lang="en-US" sz="4000" dirty="0"/>
+              <a:t>Data Description</a:t>
+            </a:r>
+          </a:p>
+        </p:txBody>
+      </p:sp>
+      <p:sp>
+        <p:nvSpPr>
+          <p:cNvPr id="7" name="Rectangle 6"/>
+          <p:cNvSpPr/>
+          <p:nvPr/>
+        </p:nvSpPr>
+        <p:spPr>
+          <a:xfrm>
+            <a:off x="1496112" y="1042808"/>
+            <a:ext cx="10053213" cy="5632311"/>
+          </a:xfrm>
+          <a:prstGeom prst="rect">
+            <a:avLst/>
+          </a:prstGeom>
+          <a:noFill/>
+        </p:spPr>
+        <p:txBody>
+          <a:bodyPr wrap="square" lIns="91440" tIns="45720" rIns="91440" bIns="45720">
+            <a:prstTxWarp prst="textPlain">
+              <a:avLst/>
+            </a:prstTxWarp>
+            <a:spAutoFit/>
+          </a:bodyPr>
+          <a:lstStyle/>
+          <a:p>
+            <a:pPr marL="285750" indent="-285750" fontAlgn="base">
+              <a:buFont typeface="Wingdings" panose="05000000000000000000" pitchFamily="2" charset="2"/>
+              <a:buChar char="v"/>
+            </a:pPr>
+            <a:r>
+              <a:rPr lang="en-US" dirty="0"/>
+              <a:t>state: Categorical, for the 51 states and the District of Columbia.</a:t>
+            </a:r>
+          </a:p>
+          <a:p>
+            <a:pPr marL="285750" indent="-285750" fontAlgn="base">
+              <a:buFont typeface="Wingdings" panose="05000000000000000000" pitchFamily="2" charset="2"/>
+              <a:buChar char="v"/>
+            </a:pPr>
+            <a:r>
+              <a:rPr lang="en-US" dirty="0" err="1"/>
+              <a:t>Area.code</a:t>
+            </a:r>
+            <a:endParaRPr lang="en-US" dirty="0"/>
+          </a:p>
+          <a:p>
+            <a:pPr marL="285750" indent="-285750" fontAlgn="base">
+              <a:buFont typeface="Wingdings" panose="05000000000000000000" pitchFamily="2" charset="2"/>
+              <a:buChar char="v"/>
+            </a:pPr>
+            <a:r>
+              <a:rPr lang="en-US" dirty="0" err="1"/>
+              <a:t>account.length</a:t>
+            </a:r>
+            <a:r>
+              <a:rPr lang="en-US" dirty="0"/>
+              <a:t>: how long the account has been active.</a:t>
+            </a:r>
+          </a:p>
+          <a:p>
+            <a:pPr marL="285750" indent="-285750" fontAlgn="base">
+              <a:buFont typeface="Wingdings" panose="05000000000000000000" pitchFamily="2" charset="2"/>
+              <a:buChar char="v"/>
+            </a:pPr>
+            <a:r>
+              <a:rPr lang="en-US" dirty="0" err="1"/>
+              <a:t>voice.plan</a:t>
+            </a:r>
+            <a:r>
+              <a:rPr lang="en-US" dirty="0"/>
+              <a:t>: yes or no, voicemail plan.</a:t>
+            </a:r>
+          </a:p>
+          <a:p>
+            <a:pPr marL="285750" indent="-285750" fontAlgn="base">
+              <a:buFont typeface="Wingdings" panose="05000000000000000000" pitchFamily="2" charset="2"/>
+              <a:buChar char="v"/>
+            </a:pPr>
+            <a:r>
+              <a:rPr lang="en-US" dirty="0" err="1"/>
+              <a:t>voice.messages</a:t>
+            </a:r>
+            <a:r>
+              <a:rPr lang="en-US" dirty="0"/>
+              <a:t>: number of voicemail messages.</a:t>
+            </a:r>
+          </a:p>
+          <a:p>
+            <a:pPr marL="285750" indent="-285750" fontAlgn="base">
+              <a:buFont typeface="Wingdings" panose="05000000000000000000" pitchFamily="2" charset="2"/>
+              <a:buChar char="v"/>
+            </a:pPr>
+            <a:r>
+              <a:rPr lang="en-US" dirty="0" err="1"/>
+              <a:t>intl.plan</a:t>
+            </a:r>
+            <a:r>
+              <a:rPr lang="en-US" dirty="0"/>
+              <a:t>: yes or no, international plan.</a:t>
+            </a:r>
+          </a:p>
+          <a:p>
+            <a:pPr marL="285750" indent="-285750" fontAlgn="base">
+              <a:buFont typeface="Wingdings" panose="05000000000000000000" pitchFamily="2" charset="2"/>
+              <a:buChar char="v"/>
+            </a:pPr>
+            <a:r>
+              <a:rPr lang="en-US" dirty="0" err="1"/>
+              <a:t>intl.mins</a:t>
+            </a:r>
+            <a:r>
+              <a:rPr lang="en-US" dirty="0"/>
+              <a:t>: minutes customer used service to make international calls.</a:t>
+            </a:r>
+          </a:p>
+          <a:p>
+            <a:pPr marL="285750" indent="-285750" fontAlgn="base">
+              <a:buFont typeface="Wingdings" panose="05000000000000000000" pitchFamily="2" charset="2"/>
+              <a:buChar char="v"/>
+            </a:pPr>
+            <a:r>
+              <a:rPr lang="en-US" dirty="0" err="1"/>
+              <a:t>intl.calls</a:t>
+            </a:r>
+            <a:r>
+              <a:rPr lang="en-US" dirty="0"/>
+              <a:t>: total number of international calls.</a:t>
+            </a:r>
+          </a:p>
+          <a:p>
+            <a:pPr marL="285750" indent="-285750" fontAlgn="base">
+              <a:buFont typeface="Wingdings" panose="05000000000000000000" pitchFamily="2" charset="2"/>
+              <a:buChar char="v"/>
+            </a:pPr>
+            <a:r>
+              <a:rPr lang="en-US" dirty="0" err="1"/>
+              <a:t>intl.charge</a:t>
+            </a:r>
+            <a:r>
+              <a:rPr lang="en-US" dirty="0"/>
+              <a:t>: total international charge.</a:t>
+            </a:r>
+          </a:p>
+          <a:p>
+            <a:pPr marL="285750" indent="-285750" fontAlgn="base">
+              <a:buFont typeface="Wingdings" panose="05000000000000000000" pitchFamily="2" charset="2"/>
+              <a:buChar char="v"/>
+            </a:pPr>
+            <a:r>
+              <a:rPr lang="en-US" dirty="0" err="1"/>
+              <a:t>day.mins</a:t>
+            </a:r>
+            <a:r>
+              <a:rPr lang="en-US" dirty="0"/>
+              <a:t>: minutes customer used service during the day.</a:t>
+            </a:r>
+          </a:p>
+          <a:p>
+            <a:pPr marL="285750" indent="-285750" fontAlgn="base">
+              <a:buFont typeface="Wingdings" panose="05000000000000000000" pitchFamily="2" charset="2"/>
+              <a:buChar char="v"/>
+            </a:pPr>
+            <a:r>
+              <a:rPr lang="en-US" dirty="0" err="1"/>
+              <a:t>day.calls</a:t>
+            </a:r>
+            <a:r>
+              <a:rPr lang="en-US" dirty="0"/>
+              <a:t>: total number of calls during the day.</a:t>
+            </a:r>
+          </a:p>
+          <a:p>
+            <a:pPr marL="285750" indent="-285750" fontAlgn="base">
+              <a:buFont typeface="Wingdings" panose="05000000000000000000" pitchFamily="2" charset="2"/>
+              <a:buChar char="v"/>
+            </a:pPr>
+            <a:r>
+              <a:rPr lang="en-US" dirty="0" err="1"/>
+              <a:t>day.charge</a:t>
+            </a:r>
+            <a:r>
+              <a:rPr lang="en-US" dirty="0"/>
+              <a:t>: total charge during the day.</a:t>
+            </a:r>
+          </a:p>
+          <a:p>
+            <a:pPr marL="285750" indent="-285750" fontAlgn="base">
+              <a:buFont typeface="Wingdings" panose="05000000000000000000" pitchFamily="2" charset="2"/>
+              <a:buChar char="v"/>
+            </a:pPr>
+            <a:r>
+              <a:rPr lang="en-US" dirty="0" err="1"/>
+              <a:t>eve.mins</a:t>
+            </a:r>
+            <a:r>
+              <a:rPr lang="en-US" dirty="0"/>
+              <a:t>: minutes customer used service during the evening.</a:t>
+            </a:r>
+          </a:p>
+          <a:p>
+            <a:pPr marL="285750" indent="-285750" fontAlgn="base">
+              <a:buFont typeface="Wingdings" panose="05000000000000000000" pitchFamily="2" charset="2"/>
+              <a:buChar char="v"/>
+            </a:pPr>
+            <a:r>
+              <a:rPr lang="en-US" dirty="0" err="1"/>
+              <a:t>eve.calls</a:t>
+            </a:r>
+            <a:r>
+              <a:rPr lang="en-US" dirty="0"/>
+              <a:t>: total number of calls during the evening.</a:t>
+            </a:r>
+          </a:p>
+          <a:p>
+            <a:pPr marL="285750" indent="-285750" fontAlgn="base">
+              <a:buFont typeface="Wingdings" panose="05000000000000000000" pitchFamily="2" charset="2"/>
+              <a:buChar char="v"/>
+            </a:pPr>
+            <a:r>
+              <a:rPr lang="en-US" dirty="0" err="1"/>
+              <a:t>eve.charge</a:t>
+            </a:r>
+            <a:r>
+              <a:rPr lang="en-US" dirty="0"/>
+              <a:t>: total charge during the evening.</a:t>
+            </a:r>
+          </a:p>
+          <a:p>
+            <a:pPr marL="285750" indent="-285750" fontAlgn="base">
+              <a:buFont typeface="Wingdings" panose="05000000000000000000" pitchFamily="2" charset="2"/>
+              <a:buChar char="v"/>
+            </a:pPr>
+            <a:r>
+              <a:rPr lang="en-US" dirty="0" err="1"/>
+              <a:t>night.mins</a:t>
+            </a:r>
+            <a:r>
+              <a:rPr lang="en-US" dirty="0"/>
+              <a:t>: minutes customer used service during the night.</a:t>
+            </a:r>
+          </a:p>
+          <a:p>
+            <a:pPr marL="285750" indent="-285750" fontAlgn="base">
+              <a:buFont typeface="Wingdings" panose="05000000000000000000" pitchFamily="2" charset="2"/>
+              <a:buChar char="v"/>
+            </a:pPr>
+            <a:r>
+              <a:rPr lang="en-US" dirty="0" err="1"/>
+              <a:t>night.calls</a:t>
+            </a:r>
+            <a:r>
+              <a:rPr lang="en-US" dirty="0"/>
+              <a:t>: total number of calls during the night.</a:t>
+            </a:r>
+          </a:p>
+          <a:p>
+            <a:pPr marL="285750" indent="-285750" fontAlgn="base">
+              <a:buFont typeface="Wingdings" panose="05000000000000000000" pitchFamily="2" charset="2"/>
+              <a:buChar char="v"/>
+            </a:pPr>
+            <a:r>
+              <a:rPr lang="en-US" dirty="0" err="1"/>
+              <a:t>night.charge</a:t>
+            </a:r>
+            <a:r>
+              <a:rPr lang="en-US" dirty="0"/>
+              <a:t>: total charge during the night.</a:t>
+            </a:r>
+          </a:p>
+          <a:p>
+            <a:pPr marL="285750" indent="-285750" fontAlgn="base">
+              <a:buFont typeface="Wingdings" panose="05000000000000000000" pitchFamily="2" charset="2"/>
+              <a:buChar char="v"/>
+            </a:pPr>
+            <a:r>
+              <a:rPr lang="en-US" dirty="0" err="1"/>
+              <a:t>customer.calls</a:t>
+            </a:r>
+            <a:r>
+              <a:rPr lang="en-US" dirty="0"/>
+              <a:t>: number of calls to customer service.</a:t>
+            </a:r>
+          </a:p>
+          <a:p>
+            <a:pPr marL="285750" indent="-285750" fontAlgn="base">
+              <a:buFont typeface="Wingdings" panose="05000000000000000000" pitchFamily="2" charset="2"/>
+              <a:buChar char="v"/>
+            </a:pPr>
+            <a:r>
+              <a:rPr lang="en-US" dirty="0"/>
+              <a:t>churn: Categorical, yes or no. Indicator of whether the customer has left the company (yes or no).</a:t>
+            </a:r>
+          </a:p>
+        </p:txBody>
+      </p:sp>
     </p:spTree>
     <p:extLst>
       <p:ext uri="{BB962C8B-B14F-4D97-AF65-F5344CB8AC3E}">
-        <p14:creationId xmlns:p14="http://schemas.microsoft.com/office/powerpoint/2010/main" val="3652519210"/>
+        <p14:creationId xmlns:p14="http://schemas.microsoft.com/office/powerpoint/2010/main" val="2028034087"/>
       </p:ext>
     </p:extLst>
   </p:cSld>
@@ -11628,7 +11628,7 @@
         </p:nvSpPr>
         <p:spPr>
           <a:xfrm>
-            <a:off x="707118" y="473950"/>
+            <a:off x="574597" y="141300"/>
             <a:ext cx="4193777" cy="769441"/>
           </a:xfrm>
           <a:prstGeom prst="rect">
@@ -11683,8 +11683,8 @@
         </p:blipFill>
         <p:spPr>
           <a:xfrm>
-            <a:off x="707118" y="1650274"/>
-            <a:ext cx="11151159" cy="3095228"/>
+            <a:off x="708662" y="984974"/>
+            <a:ext cx="11151159" cy="2593113"/>
           </a:xfrm>
           <a:prstGeom prst="rect">
             <a:avLst/>
@@ -11713,8 +11713,8 @@
         </p:blipFill>
         <p:spPr>
           <a:xfrm>
-            <a:off x="1804398" y="1650274"/>
-            <a:ext cx="8754181" cy="3095228"/>
+            <a:off x="708662" y="3693013"/>
+            <a:ext cx="8754181" cy="2482500"/>
           </a:xfrm>
           <a:prstGeom prst="rect">
             <a:avLst/>

</xml_diff>